<commit_message>
Add attributions for Roman
</commit_message>
<xml_diff>
--- a/units/11/lessons/3/resources/petascale-lesson-11.3-slides.pptx
+++ b/units/11/lessons/3/resources/petascale-lesson-11.3-slides.pptx
@@ -6741,15 +6741,7 @@
                 <a:ea typeface="Times New Roman" charset="0"/>
                 <a:cs typeface="Times New Roman" charset="0"/>
               </a:rPr>
-              <a:t>Blue Waters Petascale</a:t>
-            </a:r>
-            <a:r>
-              <a:rPr lang="en-US" sz="2700" b="1" dirty="0">
-                <a:latin typeface="Times New Roman" charset="0"/>
-                <a:ea typeface="Times New Roman" charset="0"/>
-                <a:cs typeface="Times New Roman" charset="0"/>
-              </a:rPr>
-              <a:t> Semester Curriculum v1.0</a:t>
+              <a:t>Blue Waters Petascale Semester Curriculum v1.0</a:t>
             </a:r>
             <a:r>
               <a:rPr lang="en-US" sz="2700" dirty="0">
@@ -6857,23 +6849,7 @@
                 <a:ea typeface="Times New Roman" charset="0"/>
                 <a:cs typeface="Times New Roman" charset="0"/>
               </a:rPr>
-              <a:t>Developed </a:t>
-            </a:r>
-            <a:r>
-              <a:rPr lang="en-US" sz="2700" i="1" dirty="0">
-                <a:latin typeface="Times New Roman" charset="0"/>
-                <a:ea typeface="Times New Roman" charset="0"/>
-                <a:cs typeface="Times New Roman" charset="0"/>
-              </a:rPr>
-              <a:t>by </a:t>
-            </a:r>
-            <a:r>
-              <a:rPr lang="en-US" sz="2700" i="1" dirty="0">
-                <a:latin typeface="Times New Roman" charset="0"/>
-                <a:ea typeface="Times New Roman" charset="0"/>
-                <a:cs typeface="Times New Roman" charset="0"/>
-              </a:rPr>
-              <a:t>Marc </a:t>
+              <a:t>Developed by Marc </a:t>
             </a:r>
             <a:r>
               <a:rPr lang="en-US" sz="2700" i="1" dirty="0" err="1" smtClean="0">
@@ -6882,6 +6858,22 @@
                 <a:cs typeface="Times New Roman" charset="0"/>
               </a:rPr>
               <a:t>Gagné</a:t>
+            </a:r>
+            <a:r>
+              <a:rPr lang="en-US" sz="2700" i="1" dirty="0" smtClean="0">
+                <a:latin typeface="Times New Roman" charset="0"/>
+                <a:ea typeface="Times New Roman" charset="0"/>
+                <a:cs typeface="Times New Roman" charset="0"/>
+              </a:rPr>
+              <a:t> and </a:t>
+            </a:r>
+            <a:r>
+              <a:rPr lang="en-US" sz="2700" i="1" smtClean="0">
+                <a:latin typeface="Times New Roman" charset="0"/>
+                <a:ea typeface="Times New Roman" charset="0"/>
+                <a:cs typeface="Times New Roman" charset="0"/>
+              </a:rPr>
+              <a:t>Roman Voronov</a:t>
             </a:r>
             <a:r>
               <a:rPr lang="en-US" sz="2700" i="1" dirty="0">

</xml_diff>

<commit_message>
11.3 & 11.4 review
</commit_message>
<xml_diff>
--- a/units/11/lessons/3/resources/petascale-lesson-11.3-slides.pptx
+++ b/units/11/lessons/3/resources/petascale-lesson-11.3-slides.pptx
@@ -1555,7 +1555,7 @@
         </p:nvSpPr>
         <p:spPr>
           <a:xfrm>
-            <a:off x="381300" y="685800"/>
+            <a:off x="381000" y="685800"/>
             <a:ext cx="6096000" cy="3429000"/>
           </a:xfrm>
           <a:custGeom>
@@ -1867,7 +1867,7 @@
         </p:nvSpPr>
         <p:spPr>
           <a:xfrm>
-            <a:off x="381300" y="685800"/>
+            <a:off x="381000" y="685800"/>
             <a:ext cx="6096000" cy="3429000"/>
           </a:xfrm>
           <a:custGeom>
@@ -6743,14 +6743,6 @@
               </a:rPr>
               <a:t>Blue Waters Petascale Semester Curriculum v1.0</a:t>
             </a:r>
-            <a:r>
-              <a:rPr lang="en-US" sz="2700" dirty="0">
-                <a:latin typeface="Times New Roman" charset="0"/>
-                <a:ea typeface="Times New Roman" charset="0"/>
-                <a:cs typeface="Times New Roman" charset="0"/>
-              </a:rPr>
-              <a:t/>
-            </a:r>
             <a:br>
               <a:rPr lang="en-US" sz="2700" dirty="0">
                 <a:latin typeface="Times New Roman" charset="0"/>
@@ -6764,34 +6756,10 @@
                 <a:ea typeface="Times New Roman" charset="0"/>
                 <a:cs typeface="Times New Roman" charset="0"/>
               </a:rPr>
-              <a:t>Unit </a:t>
-            </a:r>
-            <a:r>
-              <a:rPr lang="en-US" sz="2700" b="1" dirty="0" smtClean="0">
-                <a:latin typeface="Times New Roman" charset="0"/>
-                <a:ea typeface="Times New Roman" charset="0"/>
-                <a:cs typeface="Times New Roman" charset="0"/>
-              </a:rPr>
-              <a:t>11</a:t>
-            </a:r>
-            <a:r>
-              <a:rPr lang="en-US" sz="2700" b="1" dirty="0">
-                <a:latin typeface="Times New Roman" charset="0"/>
-                <a:ea typeface="Times New Roman" charset="0"/>
-                <a:cs typeface="Times New Roman" charset="0"/>
-              </a:rPr>
-              <a:t>: Domain Science: Astrophysical Fluid </a:t>
-            </a:r>
-            <a:r>
-              <a:rPr lang="en-US" sz="2700" b="1" dirty="0" smtClean="0">
-                <a:latin typeface="Times New Roman" charset="0"/>
-                <a:ea typeface="Times New Roman" charset="0"/>
-                <a:cs typeface="Times New Roman" charset="0"/>
-              </a:rPr>
-              <a:t/>
+              <a:t>Unit 11: Domain Science: Astrophysical Fluid </a:t>
             </a:r>
             <a:br>
-              <a:rPr lang="en-US" sz="2700" b="1" dirty="0" smtClean="0">
+              <a:rPr lang="en-US" sz="2700" b="1" dirty="0">
                 <a:latin typeface="Times New Roman" charset="0"/>
                 <a:ea typeface="Times New Roman" charset="0"/>
                 <a:cs typeface="Times New Roman" charset="0"/>
@@ -6803,23 +6771,7 @@
                 <a:ea typeface="Times New Roman" charset="0"/>
                 <a:cs typeface="Times New Roman" charset="0"/>
               </a:rPr>
-              <a:t> </a:t>
-            </a:r>
-            <a:r>
-              <a:rPr lang="en-US" sz="2700" b="1" dirty="0" smtClean="0">
-                <a:latin typeface="Times New Roman" charset="0"/>
-                <a:ea typeface="Times New Roman" charset="0"/>
-                <a:cs typeface="Times New Roman" charset="0"/>
-              </a:rPr>
-              <a:t>    Dynamics</a:t>
-            </a:r>
-            <a:r>
-              <a:rPr lang="en-US" sz="2700" b="1" dirty="0">
-                <a:latin typeface="Times New Roman" charset="0"/>
-                <a:ea typeface="Times New Roman" charset="0"/>
-                <a:cs typeface="Times New Roman" charset="0"/>
-              </a:rPr>
-              <a:t/>
+              <a:t>     Dynamics</a:t>
             </a:r>
             <a:br>
               <a:rPr lang="en-US" sz="2700" b="1" dirty="0">
@@ -6852,7 +6804,7 @@
               <a:t>Developed by Marc </a:t>
             </a:r>
             <a:r>
-              <a:rPr lang="en-US" sz="2700" i="1" dirty="0" err="1" smtClean="0">
+              <a:rPr lang="en-US" sz="2700" i="1" dirty="0" err="1">
                 <a:latin typeface="Times New Roman" charset="0"/>
                 <a:ea typeface="Times New Roman" charset="0"/>
                 <a:cs typeface="Times New Roman" charset="0"/>
@@ -6860,7 +6812,7 @@
               <a:t>Gagné</a:t>
             </a:r>
             <a:r>
-              <a:rPr lang="en-US" sz="2700" i="1" dirty="0" smtClean="0">
+              <a:rPr lang="en-US" sz="2700" i="1" dirty="0">
                 <a:latin typeface="Times New Roman" charset="0"/>
                 <a:ea typeface="Times New Roman" charset="0"/>
                 <a:cs typeface="Times New Roman" charset="0"/>
@@ -6868,20 +6820,12 @@
               <a:t> and </a:t>
             </a:r>
             <a:r>
-              <a:rPr lang="en-US" sz="2700" i="1" smtClean="0">
+              <a:rPr lang="en-US" sz="2700" i="1">
                 <a:latin typeface="Times New Roman" charset="0"/>
                 <a:ea typeface="Times New Roman" charset="0"/>
                 <a:cs typeface="Times New Roman" charset="0"/>
               </a:rPr>
               <a:t>Roman Voronov</a:t>
-            </a:r>
-            <a:r>
-              <a:rPr lang="en-US" sz="2700" i="1" dirty="0">
-                <a:latin typeface="Times New Roman" charset="0"/>
-                <a:ea typeface="Times New Roman" charset="0"/>
-                <a:cs typeface="Times New Roman" charset="0"/>
-              </a:rPr>
-              <a:t/>
             </a:r>
             <a:br>
               <a:rPr lang="en-US" sz="2700" i="1" dirty="0">
@@ -6911,13 +6855,6 @@
   <p:clrMapOvr>
     <a:masterClrMapping/>
   </p:clrMapOvr>
-  <p:timing>
-    <p:tnLst>
-      <p:par>
-        <p:cTn id="1" dur="indefinite" restart="never" nodeType="tmRoot"/>
-      </p:par>
-    </p:tnLst>
-  </p:timing>
 </p:sld>
 </file>
 
@@ -7015,10 +6952,10 @@
               <a:buNone/>
             </a:pPr>
             <a:r>
-              <a:rPr lang="en"/>
+              <a:rPr lang="en" dirty="0"/>
               <a:t>Even though these equations were written down nearly 200 years ago, why they work, and whether they always work, is not known. One of the Clay Mathematics Institute Millennium Prizes is devoted to this very problem.</a:t>
             </a:r>
-            <a:endParaRPr/>
+            <a:endParaRPr dirty="0"/>
           </a:p>
           <a:p>
             <a:pPr marL="0" lvl="0" indent="0" algn="l" rtl="0">
@@ -7026,35 +6963,19 @@
                 <a:spcPts val="1600"/>
               </a:spcBef>
               <a:spcAft>
-                <a:spcPts val="0"/>
+                <a:spcPts val="1600"/>
               </a:spcAft>
               <a:buNone/>
             </a:pPr>
             <a:r>
-              <a:rPr lang="en"/>
-              <a:t>“The challenge is to make substantial progress toward a mathematical theory which will unlock the secrets hidden in the Navier-Stokes equations.”</a:t>
-            </a:r>
-            <a:endParaRPr/>
-          </a:p>
-          <a:p>
-            <a:pPr marL="0" lvl="0" indent="0" algn="l" rtl="0">
-              <a:spcBef>
-                <a:spcPts val="1600"/>
-              </a:spcBef>
-              <a:spcAft>
-                <a:spcPts val="1600"/>
-              </a:spcAft>
-              <a:buNone/>
-            </a:pPr>
-            <a:r>
-              <a:rPr lang="en"/>
+              <a:rPr lang="en" dirty="0"/>
               <a:t>For details:</a:t>
             </a:r>
             <a:br>
-              <a:rPr lang="en"/>
+              <a:rPr lang="en" dirty="0"/>
             </a:br>
             <a:r>
-              <a:rPr lang="en" u="sng">
+              <a:rPr lang="en" u="sng" dirty="0">
                 <a:solidFill>
                   <a:schemeClr val="hlink"/>
                 </a:solidFill>
@@ -7062,7 +6983,7 @@
               </a:rPr>
               <a:t>EXISTENCE AND SMOOTHNESS OF THE NAVIER–STOKES EQUATION</a:t>
             </a:r>
-            <a:endParaRPr/>
+            <a:endParaRPr dirty="0"/>
           </a:p>
         </p:txBody>
       </p:sp>
@@ -7644,23 +7565,7 @@
                 <a:ea typeface="Times New Roman" charset="0"/>
                 <a:cs typeface="Times New Roman" charset="0"/>
               </a:rPr>
-              <a:t>CC </a:t>
-            </a:r>
-            <a:r>
-              <a:rPr lang="en-US" sz="2100" dirty="0" smtClean="0">
-                <a:latin typeface="Times New Roman" charset="0"/>
-                <a:ea typeface="Times New Roman" charset="0"/>
-                <a:cs typeface="Times New Roman" charset="0"/>
-              </a:rPr>
-              <a:t>BY-SA </a:t>
-            </a:r>
-            <a:r>
-              <a:rPr lang="en-US" sz="2100" dirty="0">
-                <a:latin typeface="Times New Roman" charset="0"/>
-                <a:ea typeface="Times New Roman" charset="0"/>
-                <a:cs typeface="Times New Roman" charset="0"/>
-              </a:rPr>
-              <a:t>4.0. To view a copy of this license, visit </a:t>
+              <a:t>CC BY-SA 4.0. To view a copy of this license, visit </a:t>
             </a:r>
             <a:r>
               <a:rPr lang="en-US" sz="2100" dirty="0">
@@ -7669,24 +7574,7 @@
                 <a:cs typeface="Times New Roman" charset="0"/>
                 <a:hlinkClick r:id="rId2"/>
               </a:rPr>
-              <a:t>https://</a:t>
-            </a:r>
-            <a:r>
-              <a:rPr lang="en-US" sz="2100" dirty="0" smtClean="0">
-                <a:latin typeface="Times New Roman" charset="0"/>
-                <a:ea typeface="Times New Roman" charset="0"/>
-                <a:cs typeface="Times New Roman" charset="0"/>
-                <a:hlinkClick r:id="rId2"/>
-              </a:rPr>
-              <a:t>creativecommons.org/licenses/by-sa/4.0</a:t>
-            </a:r>
-            <a:r>
-              <a:rPr lang="en-US" sz="2100" dirty="0">
-                <a:latin typeface="Times New Roman" charset="0"/>
-                <a:ea typeface="Times New Roman" charset="0"/>
-                <a:cs typeface="Times New Roman" charset="0"/>
-              </a:rPr>
-              <a:t/>
+              <a:t>https://creativecommons.org/licenses/by-sa/4.0</a:t>
             </a:r>
             <a:br>
               <a:rPr lang="en-US" sz="2100" dirty="0">
@@ -7695,14 +7583,6 @@
                 <a:cs typeface="Times New Roman" charset="0"/>
               </a:rPr>
             </a:br>
-            <a:r>
-              <a:rPr lang="en-US" sz="2100" dirty="0">
-                <a:latin typeface="Times New Roman" charset="0"/>
-                <a:ea typeface="Times New Roman" charset="0"/>
-                <a:cs typeface="Times New Roman" charset="0"/>
-              </a:rPr>
-              <a:t/>
-            </a:r>
             <a:br>
               <a:rPr lang="en-US" sz="2100" dirty="0">
                 <a:latin typeface="Times New Roman" charset="0"/>
@@ -7727,14 +7607,6 @@
               </a:rPr>
               <a:t>http://shodor.org/petascale/materials/semester-curriculum</a:t>
             </a:r>
-            <a:r>
-              <a:rPr lang="en-US" sz="2100" dirty="0">
-                <a:latin typeface="Times New Roman" charset="0"/>
-                <a:ea typeface="Times New Roman" charset="0"/>
-                <a:cs typeface="Times New Roman" charset="0"/>
-              </a:rPr>
-              <a:t/>
-            </a:r>
             <a:br>
               <a:rPr lang="en-US" sz="2100" dirty="0">
                 <a:latin typeface="Times New Roman" charset="0"/>
@@ -7742,14 +7614,6 @@
                 <a:cs typeface="Times New Roman" charset="0"/>
               </a:rPr>
             </a:br>
-            <a:r>
-              <a:rPr lang="en-US" sz="2100" dirty="0">
-                <a:latin typeface="Times New Roman" charset="0"/>
-                <a:ea typeface="Times New Roman" charset="0"/>
-                <a:cs typeface="Times New Roman" charset="0"/>
-              </a:rPr>
-              <a:t/>
-            </a:r>
             <a:br>
               <a:rPr lang="en-US" sz="2100" dirty="0">
                 <a:latin typeface="Times New Roman" charset="0"/>
@@ -7774,14 +7638,6 @@
               </a:rPr>
               <a:t>https://github.com/shodor-education/petascale-semester-curriculum</a:t>
             </a:r>
-            <a:r>
-              <a:rPr lang="en-US" sz="2100" dirty="0">
-                <a:latin typeface="Times New Roman" charset="0"/>
-                <a:ea typeface="Times New Roman" charset="0"/>
-                <a:cs typeface="Times New Roman" charset="0"/>
-              </a:rPr>
-              <a:t/>
-            </a:r>
             <a:br>
               <a:rPr lang="en-US" sz="2100" dirty="0">
                 <a:latin typeface="Times New Roman" charset="0"/>
@@ -7789,14 +7645,6 @@
                 <a:cs typeface="Times New Roman" charset="0"/>
               </a:rPr>
             </a:br>
-            <a:r>
-              <a:rPr lang="en-US" sz="2100" dirty="0">
-                <a:latin typeface="Times New Roman" charset="0"/>
-                <a:ea typeface="Times New Roman" charset="0"/>
-                <a:cs typeface="Times New Roman" charset="0"/>
-              </a:rPr>
-              <a:t/>
-            </a:r>
             <a:br>
               <a:rPr lang="en-US" sz="2100" dirty="0">
                 <a:latin typeface="Times New Roman" charset="0"/>
@@ -7937,10 +7785,10 @@
               <a:buChar char="●"/>
             </a:pPr>
             <a:r>
-              <a:rPr lang="en"/>
+              <a:rPr lang="en" dirty="0"/>
               <a:t>Fundamentally, physical interactions on many scales, from blood flow within vesicles, to plasma flows on the scales of clusters of galaxies are dictated by collisions between atomic particles. For a hundred years now, we have known that these interactions are governed by quantum mechanics on the microscopic scale. But how do we realistically model these flows on macroscopic scales?</a:t>
             </a:r>
-            <a:endParaRPr/>
+            <a:endParaRPr dirty="0"/>
           </a:p>
           <a:p>
             <a:pPr marL="457200" lvl="0" indent="-342900" algn="l" rtl="0">
@@ -7954,10 +7802,10 @@
               <a:buChar char="●"/>
             </a:pPr>
             <a:r>
-              <a:rPr lang="en"/>
+              <a:rPr lang="en" dirty="0"/>
               <a:t>If we take a classical, deterministic approach to these problems, we can solve a range of macroscopic problems accurately, provided we can describe the large number of colliding particles as a fluid.</a:t>
             </a:r>
-            <a:endParaRPr/>
+            <a:endParaRPr dirty="0"/>
           </a:p>
         </p:txBody>
       </p:sp>
@@ -8393,13 +8241,13 @@
               <a:buChar char="●"/>
             </a:pPr>
             <a:r>
-              <a:rPr lang="en" sz="1600"/>
+              <a:rPr lang="en" sz="1600" dirty="0"/>
               <a:t>So now we have a bunch of gas with a temperature 𝑇 and number density 𝑛. If we can determine the average mass of the particles, which we’ll call 𝜇, the mean molecular mass, then the mass density is 𝜌 = 𝜇𝑛 and the pressure of the ideal gas is 𝑃 = 𝑛𝑅𝑇 = 𝜌𝑅𝑇 / 𝜇. 𝑅 is the gas constant from your high-school chemistry class.</a:t>
             </a:r>
             <a:br>
-              <a:rPr lang="en" sz="1600"/>
+              <a:rPr lang="en" sz="1600" dirty="0"/>
             </a:br>
-            <a:endParaRPr sz="1600"/>
+            <a:endParaRPr sz="1600" dirty="0"/>
           </a:p>
           <a:p>
             <a:pPr marL="457200" lvl="0" indent="-330200" algn="l" rtl="0">
@@ -8413,10 +8261,10 @@
               <a:buChar char="●"/>
             </a:pPr>
             <a:r>
-              <a:rPr lang="en" sz="1600"/>
+              <a:rPr lang="en" sz="1600" dirty="0"/>
               <a:t>The pressure is a measure of the force per unit area - think of the force a warm gas exerts on the wall of a container. But the pressure is also directly related to the energy density - the amount of internal energy in the gas per unit volume. The exact scaling between internal energy and pressure depends on the nature of the ideal gas, and the thermodynamic process being considered (isobaric, isothermal, adiabatic, etc.)</a:t>
             </a:r>
-            <a:endParaRPr sz="1600"/>
+            <a:endParaRPr sz="1600" dirty="0"/>
           </a:p>
         </p:txBody>
       </p:sp>
@@ -8550,88 +8398,6 @@
           </a:p>
         </p:txBody>
       </p:sp>
-      <p:pic>
-        <p:nvPicPr>
-          <p:cNvPr id="86" name="Google Shape;86;p18"/>
-          <p:cNvPicPr preferRelativeResize="0"/>
-          <p:nvPr/>
-        </p:nvPicPr>
-        <p:blipFill rotWithShape="1">
-          <a:blip r:embed="rId3">
-            <a:alphaModFix/>
-          </a:blip>
-          <a:srcRect t="11700" b="3510"/>
-          <a:stretch/>
-        </p:blipFill>
-        <p:spPr>
-          <a:xfrm>
-            <a:off x="2249200" y="3325675"/>
-            <a:ext cx="4044100" cy="1243200"/>
-          </a:xfrm>
-          <a:prstGeom prst="rect">
-            <a:avLst/>
-          </a:prstGeom>
-          <a:noFill/>
-          <a:ln>
-            <a:noFill/>
-          </a:ln>
-        </p:spPr>
-      </p:pic>
-      <p:sp>
-        <p:nvSpPr>
-          <p:cNvPr id="87" name="Google Shape;87;p18"/>
-          <p:cNvSpPr txBox="1"/>
-          <p:nvPr/>
-        </p:nvSpPr>
-        <p:spPr>
-          <a:xfrm>
-            <a:off x="163550" y="4675725"/>
-            <a:ext cx="8743200" cy="335400"/>
-          </a:xfrm>
-          <a:prstGeom prst="rect">
-            <a:avLst/>
-          </a:prstGeom>
-          <a:noFill/>
-          <a:ln>
-            <a:noFill/>
-          </a:ln>
-        </p:spPr>
-        <p:txBody>
-          <a:bodyPr spcFirstLastPara="1" wrap="square" lIns="91425" tIns="91425" rIns="91425" bIns="91425" anchor="t" anchorCtr="0">
-            <a:noAutofit/>
-          </a:bodyPr>
-          <a:lstStyle/>
-          <a:p>
-            <a:pPr marL="0" lvl="0" indent="0" algn="ctr" rtl="0">
-              <a:spcBef>
-                <a:spcPts val="0"/>
-              </a:spcBef>
-              <a:spcAft>
-                <a:spcPts val="0"/>
-              </a:spcAft>
-              <a:buNone/>
-            </a:pPr>
-            <a:r>
-              <a:rPr lang="en" sz="1200"/>
-              <a:t>Fig. 1.2 from Chapter 1 of </a:t>
-            </a:r>
-            <a:r>
-              <a:rPr lang="en" sz="1200" u="sng">
-                <a:solidFill>
-                  <a:schemeClr val="hlink"/>
-                </a:solidFill>
-                <a:hlinkClick r:id="rId4"/>
-              </a:rPr>
-              <a:t>Numerical PDE Techniques for Scientists and Engineers</a:t>
-            </a:r>
-            <a:r>
-              <a:rPr lang="en" sz="1200"/>
-              <a:t> by Dinshaw Balsara</a:t>
-            </a:r>
-            <a:endParaRPr sz="1200"/>
-          </a:p>
-        </p:txBody>
-      </p:sp>
     </p:spTree>
   </p:cSld>
   <p:clrMapOvr>
@@ -8735,10 +8501,10 @@
               <a:buChar char="●"/>
             </a:pPr>
             <a:r>
-              <a:rPr lang="en" sz="1600"/>
+              <a:rPr lang="en" sz="1600" dirty="0"/>
               <a:t>Earlier we expressed the internal thermal velocity of one particle as 𝒘 and the velocity of a blob of particles (the bulk velocity) as 𝒗. Thus the total velocity vector of any particle is 𝒖 = 𝒗 + 𝒘. Without going into detail, applying Boltzmann’s ideas about ideal gases to Newton’s equations of motion, allows us to write down three equations for the time evolution of the fluid density, the momentum density, and the energy density.</a:t>
             </a:r>
-            <a:endParaRPr sz="1600"/>
+            <a:endParaRPr sz="1600" dirty="0"/>
           </a:p>
           <a:p>
             <a:pPr marL="457200" lvl="0" indent="-330200" algn="l" rtl="0">
@@ -8752,10 +8518,10 @@
               <a:buChar char="●"/>
             </a:pPr>
             <a:r>
-              <a:rPr lang="en" sz="1600"/>
+              <a:rPr lang="en" sz="1600" dirty="0"/>
               <a:t>These equations express the fact that collisions, which lie at the heart of these interactions conserve mass, momentum, and energy. These can be expressed as partial differential equations (PDEs).</a:t>
             </a:r>
-            <a:endParaRPr sz="1600"/>
+            <a:endParaRPr sz="1600" dirty="0"/>
           </a:p>
           <a:p>
             <a:pPr marL="457200" lvl="0" indent="-330200" algn="l" rtl="0">
@@ -8769,10 +8535,10 @@
               <a:buChar char="●"/>
             </a:pPr>
             <a:r>
-              <a:rPr lang="en" sz="1600"/>
+              <a:rPr lang="en" sz="1600" dirty="0"/>
               <a:t>The result is three partial differential equations in space and time:</a:t>
             </a:r>
-            <a:endParaRPr sz="1600"/>
+            <a:endParaRPr sz="1600" dirty="0"/>
           </a:p>
           <a:p>
             <a:pPr marL="914400" lvl="1" indent="-330200" algn="l" rtl="0">
@@ -8786,10 +8552,10 @@
               <a:buChar char="○"/>
             </a:pPr>
             <a:r>
-              <a:rPr lang="en" sz="1600"/>
+              <a:rPr lang="en" sz="1600" dirty="0"/>
               <a:t>The continuity equation (conserves mass)</a:t>
             </a:r>
-            <a:endParaRPr sz="1600"/>
+            <a:endParaRPr sz="1600" dirty="0"/>
           </a:p>
           <a:p>
             <a:pPr marL="914400" lvl="1" indent="-330200" algn="l" rtl="0">
@@ -8803,10 +8569,10 @@
               <a:buChar char="○"/>
             </a:pPr>
             <a:r>
-              <a:rPr lang="en" sz="1600"/>
+              <a:rPr lang="en" sz="1600" dirty="0"/>
               <a:t>The momentum equation (conserves momentum)</a:t>
             </a:r>
-            <a:endParaRPr sz="1600"/>
+            <a:endParaRPr sz="1600" dirty="0"/>
           </a:p>
           <a:p>
             <a:pPr marL="914400" lvl="1" indent="-330200" algn="l" rtl="0">
@@ -8820,10 +8586,10 @@
               <a:buChar char="○"/>
             </a:pPr>
             <a:r>
-              <a:rPr lang="en" sz="1600"/>
+              <a:rPr lang="en" sz="1600" dirty="0"/>
               <a:t>The energy equation (accounts for energy)</a:t>
             </a:r>
-            <a:endParaRPr sz="1600"/>
+            <a:endParaRPr sz="1600" dirty="0"/>
           </a:p>
         </p:txBody>
       </p:sp>
@@ -8930,13 +8696,13 @@
               <a:buChar char="●"/>
             </a:pPr>
             <a:r>
-              <a:rPr lang="en" sz="1600"/>
+              <a:rPr lang="en" sz="1600" dirty="0"/>
               <a:t>Historically, this problem was first formalized by Leonhard Euler in 1757 by ignoring the effects of fluid viscosity and thermal conductivity. The resulting PDEs are now known as the Euler Equations.</a:t>
             </a:r>
             <a:br>
-              <a:rPr lang="en" sz="1600"/>
+              <a:rPr lang="en" sz="1600" dirty="0"/>
             </a:br>
-            <a:endParaRPr sz="1600"/>
+            <a:endParaRPr sz="1600" dirty="0"/>
           </a:p>
           <a:p>
             <a:pPr marL="457200" lvl="0" indent="-323850" algn="l" rtl="0">
@@ -8950,17 +8716,13 @@
               <a:buChar char="●"/>
             </a:pPr>
             <a:r>
-              <a:rPr lang="en" sz="1600"/>
+              <a:rPr lang="en" sz="1600" dirty="0"/>
               <a:t>In 1823, Claude-Louis Navier published a memoir on the motions of fluids which could account for friction (dissipation of energy) in fluids by using Laplace’s newly formulated idea of molecular forces. Those equations were formalized as PDEs and are now known as the Navier-Stokes equations. The Euler equations are a specific case of the Navier-Stokes equations. The enterprise of fluid dynamics has been to solve the Navier-Stokes equations with certain boundary conditions using a range of analytical and numerical techniques.</a:t>
             </a:r>
-            <a:r>
-              <a:rPr lang="en" sz="1500"/>
-              <a:t/>
-            </a:r>
             <a:br>
-              <a:rPr lang="en" sz="1500"/>
+              <a:rPr lang="en" sz="1500" dirty="0"/>
             </a:br>
-            <a:endParaRPr sz="1500"/>
+            <a:endParaRPr sz="1500" dirty="0"/>
           </a:p>
         </p:txBody>
       </p:sp>

</xml_diff>